<commit_message>
Added material for Kernel-Mode Constructs
</commit_message>
<xml_diff>
--- a/Lab 6/RAU-OS-Lab6.pptx
+++ b/Lab 6/RAU-OS-Lab6.pptx
@@ -5,7 +5,7 @@
     <p:sldMasterId id="2147483677" r:id="rId1"/>
   </p:sldMasterIdLst>
   <p:notesMasterIdLst>
-    <p:notesMasterId r:id="rId11"/>
+    <p:notesMasterId r:id="rId18"/>
   </p:notesMasterIdLst>
   <p:sldIdLst>
     <p:sldId id="256" r:id="rId2"/>
@@ -17,6 +17,13 @@
     <p:sldId id="262" r:id="rId8"/>
     <p:sldId id="263" r:id="rId9"/>
     <p:sldId id="264" r:id="rId10"/>
+    <p:sldId id="265" r:id="rId11"/>
+    <p:sldId id="266" r:id="rId12"/>
+    <p:sldId id="267" r:id="rId13"/>
+    <p:sldId id="268" r:id="rId14"/>
+    <p:sldId id="269" r:id="rId15"/>
+    <p:sldId id="270" r:id="rId16"/>
+    <p:sldId id="271" r:id="rId17"/>
   </p:sldIdLst>
   <p:sldSz cx="12192000" cy="6858000"/>
   <p:notesSz cx="6858000" cy="9144000"/>
@@ -205,7 +212,7 @@
           <a:p>
             <a:fld id="{61AF85FF-F9A3-46A8-8E5B-32C48F0BE929}" type="datetimeFigureOut">
               <a:rPr lang="en-US" smtClean="0"/>
-              <a:t>12/9/2015</a:t>
+              <a:t>12/17/2015</a:t>
             </a:fld>
             <a:endParaRPr lang="en-US"/>
           </a:p>
@@ -471,6 +478,122 @@
     </a:lvl9pPr>
   </p:notesStyle>
 </p:notesMaster>
+</file>
+
+<file path=ppt/notesSlides/notesSlide1.xml><?xml version="1.0" encoding="utf-8"?>
+<p:notes xmlns:a="http://schemas.openxmlformats.org/drawingml/2006/main" xmlns:r="http://schemas.openxmlformats.org/officeDocument/2006/relationships" xmlns:p="http://schemas.openxmlformats.org/presentationml/2006/main">
+  <p:cSld>
+    <p:spTree>
+      <p:nvGrpSpPr>
+        <p:cNvPr id="1" name=""/>
+        <p:cNvGrpSpPr/>
+        <p:nvPr/>
+      </p:nvGrpSpPr>
+      <p:grpSpPr>
+        <a:xfrm>
+          <a:off x="0" y="0"/>
+          <a:ext cx="0" cy="0"/>
+          <a:chOff x="0" y="0"/>
+          <a:chExt cx="0" cy="0"/>
+        </a:xfrm>
+      </p:grpSpPr>
+      <p:sp>
+        <p:nvSpPr>
+          <p:cNvPr id="2" name="Slide Image Placeholder 1"/>
+          <p:cNvSpPr>
+            <a:spLocks noGrp="1" noRot="1" noChangeAspect="1"/>
+          </p:cNvSpPr>
+          <p:nvPr>
+            <p:ph type="sldImg"/>
+          </p:nvPr>
+        </p:nvSpPr>
+        <p:spPr/>
+      </p:sp>
+      <p:sp>
+        <p:nvSpPr>
+          <p:cNvPr id="3" name="Notes Placeholder 2"/>
+          <p:cNvSpPr>
+            <a:spLocks noGrp="1"/>
+          </p:cNvSpPr>
+          <p:nvPr>
+            <p:ph type="body" idx="1"/>
+          </p:nvPr>
+        </p:nvSpPr>
+        <p:spPr/>
+        <p:txBody>
+          <a:bodyPr/>
+          <a:lstStyle/>
+          <a:p>
+            <a:r>
+              <a:rPr lang="en-US" dirty="0" smtClean="0"/>
+              <a:t>So now let me summarize how these three kernel-mode primitives behave: • When multiple threads are waiting on an auto-reset event, setting the event causes only one thread to become unblocked. • When multiple threads are waiting on a manual-reset event, setting the event causes all threads </a:t>
+            </a:r>
+          </a:p>
+          <a:p>
+            <a:r>
+              <a:rPr lang="en-US" dirty="0" smtClean="0"/>
+              <a:t>www.it-ebooks.info</a:t>
+            </a:r>
+          </a:p>
+          <a:p>
+            <a:r>
+              <a:rPr lang="en-US" dirty="0" smtClean="0"/>
+              <a:t>to become unblocked. • When multiple threads are waiting on a semaphore, releasing the semaphore causes </a:t>
+            </a:r>
+            <a:r>
+              <a:rPr lang="en-US" dirty="0" err="1" smtClean="0"/>
+              <a:t>releaseCount</a:t>
+            </a:r>
+            <a:r>
+              <a:rPr lang="en-US" dirty="0" smtClean="0"/>
+              <a:t> threads to become unblocked (where </a:t>
+            </a:r>
+            <a:r>
+              <a:rPr lang="en-US" dirty="0" err="1" smtClean="0"/>
+              <a:t>releaseCount</a:t>
+            </a:r>
+            <a:r>
+              <a:rPr lang="en-US" dirty="0" smtClean="0"/>
+              <a:t> is the argument passed to Semaphore’s Release method). </a:t>
+            </a:r>
+            <a:endParaRPr lang="en-US" dirty="0"/>
+          </a:p>
+        </p:txBody>
+      </p:sp>
+      <p:sp>
+        <p:nvSpPr>
+          <p:cNvPr id="4" name="Slide Number Placeholder 3"/>
+          <p:cNvSpPr>
+            <a:spLocks noGrp="1"/>
+          </p:cNvSpPr>
+          <p:nvPr>
+            <p:ph type="sldNum" sz="quarter" idx="10"/>
+          </p:nvPr>
+        </p:nvSpPr>
+        <p:spPr/>
+        <p:txBody>
+          <a:bodyPr/>
+          <a:lstStyle/>
+          <a:p>
+            <a:fld id="{3DD81AD1-E669-4F14-9404-A87E7979A64F}" type="slidenum">
+              <a:rPr lang="en-US" smtClean="0"/>
+              <a:t>15</a:t>
+            </a:fld>
+            <a:endParaRPr lang="en-US"/>
+          </a:p>
+        </p:txBody>
+      </p:sp>
+    </p:spTree>
+    <p:extLst>
+      <p:ext uri="{BB962C8B-B14F-4D97-AF65-F5344CB8AC3E}">
+        <p14:creationId xmlns:p14="http://schemas.microsoft.com/office/powerpoint/2010/main" val="2039486017"/>
+      </p:ext>
+    </p:extLst>
+  </p:cSld>
+  <p:clrMapOvr>
+    <a:masterClrMapping/>
+  </p:clrMapOvr>
+</p:notes>
 </file>
 
 <file path=ppt/slideLayouts/slideLayout1.xml><?xml version="1.0" encoding="utf-8"?>
@@ -1218,7 +1341,7 @@
           <a:p>
             <a:fld id="{F52FA2A7-1564-41AF-AA2A-65EB1F90CC9B}" type="datetimeFigureOut">
               <a:rPr lang="en-US" smtClean="0"/>
-              <a:t>12/9/2015</a:t>
+              <a:t>12/17/2015</a:t>
             </a:fld>
             <a:endParaRPr lang="en-US"/>
           </a:p>
@@ -1469,7 +1592,7 @@
           <a:p>
             <a:fld id="{F52FA2A7-1564-41AF-AA2A-65EB1F90CC9B}" type="datetimeFigureOut">
               <a:rPr lang="en-US" smtClean="0"/>
-              <a:t>12/9/2015</a:t>
+              <a:t>12/17/2015</a:t>
             </a:fld>
             <a:endParaRPr lang="en-US"/>
           </a:p>
@@ -1783,7 +1906,7 @@
           <a:p>
             <a:fld id="{F52FA2A7-1564-41AF-AA2A-65EB1F90CC9B}" type="datetimeFigureOut">
               <a:rPr lang="en-US" smtClean="0"/>
-              <a:t>12/9/2015</a:t>
+              <a:t>12/17/2015</a:t>
             </a:fld>
             <a:endParaRPr lang="en-US"/>
           </a:p>
@@ -2116,7 +2239,7 @@
           <a:p>
             <a:fld id="{F52FA2A7-1564-41AF-AA2A-65EB1F90CC9B}" type="datetimeFigureOut">
               <a:rPr lang="en-US" smtClean="0"/>
-              <a:t>12/9/2015</a:t>
+              <a:t>12/17/2015</a:t>
             </a:fld>
             <a:endParaRPr lang="en-US"/>
           </a:p>
@@ -2430,7 +2553,7 @@
           <a:p>
             <a:fld id="{F52FA2A7-1564-41AF-AA2A-65EB1F90CC9B}" type="datetimeFigureOut">
               <a:rPr lang="en-US" smtClean="0"/>
-              <a:t>12/9/2015</a:t>
+              <a:t>12/17/2015</a:t>
             </a:fld>
             <a:endParaRPr lang="en-US"/>
           </a:p>
@@ -2823,7 +2946,7 @@
           <a:p>
             <a:fld id="{F52FA2A7-1564-41AF-AA2A-65EB1F90CC9B}" type="datetimeFigureOut">
               <a:rPr lang="en-US" smtClean="0"/>
-              <a:t>12/9/2015</a:t>
+              <a:t>12/17/2015</a:t>
             </a:fld>
             <a:endParaRPr lang="en-US"/>
           </a:p>
@@ -2993,7 +3116,7 @@
           <a:p>
             <a:fld id="{F52FA2A7-1564-41AF-AA2A-65EB1F90CC9B}" type="datetimeFigureOut">
               <a:rPr lang="en-US" smtClean="0"/>
-              <a:t>12/9/2015</a:t>
+              <a:t>12/17/2015</a:t>
             </a:fld>
             <a:endParaRPr lang="en-US"/>
           </a:p>
@@ -3173,7 +3296,7 @@
           <a:p>
             <a:fld id="{F52FA2A7-1564-41AF-AA2A-65EB1F90CC9B}" type="datetimeFigureOut">
               <a:rPr lang="en-US" smtClean="0"/>
-              <a:t>12/9/2015</a:t>
+              <a:t>12/17/2015</a:t>
             </a:fld>
             <a:endParaRPr lang="en-US"/>
           </a:p>
@@ -3343,7 +3466,7 @@
           <a:p>
             <a:fld id="{F52FA2A7-1564-41AF-AA2A-65EB1F90CC9B}" type="datetimeFigureOut">
               <a:rPr lang="en-US" smtClean="0"/>
-              <a:t>12/9/2015</a:t>
+              <a:t>12/17/2015</a:t>
             </a:fld>
             <a:endParaRPr lang="en-US"/>
           </a:p>
@@ -3590,7 +3713,7 @@
           <a:p>
             <a:fld id="{F52FA2A7-1564-41AF-AA2A-65EB1F90CC9B}" type="datetimeFigureOut">
               <a:rPr lang="en-US" smtClean="0"/>
-              <a:t>12/9/2015</a:t>
+              <a:t>12/17/2015</a:t>
             </a:fld>
             <a:endParaRPr lang="en-US"/>
           </a:p>
@@ -3822,7 +3945,7 @@
           <a:p>
             <a:fld id="{F52FA2A7-1564-41AF-AA2A-65EB1F90CC9B}" type="datetimeFigureOut">
               <a:rPr lang="en-US" smtClean="0"/>
-              <a:t>12/9/2015</a:t>
+              <a:t>12/17/2015</a:t>
             </a:fld>
             <a:endParaRPr lang="en-US"/>
           </a:p>
@@ -4196,7 +4319,7 @@
           <a:p>
             <a:fld id="{F52FA2A7-1564-41AF-AA2A-65EB1F90CC9B}" type="datetimeFigureOut">
               <a:rPr lang="en-US" smtClean="0"/>
-              <a:t>12/9/2015</a:t>
+              <a:t>12/17/2015</a:t>
             </a:fld>
             <a:endParaRPr lang="en-US"/>
           </a:p>
@@ -4319,7 +4442,7 @@
           <a:p>
             <a:fld id="{F52FA2A7-1564-41AF-AA2A-65EB1F90CC9B}" type="datetimeFigureOut">
               <a:rPr lang="en-US" smtClean="0"/>
-              <a:t>12/9/2015</a:t>
+              <a:t>12/17/2015</a:t>
             </a:fld>
             <a:endParaRPr lang="en-US"/>
           </a:p>
@@ -4414,7 +4537,7 @@
           <a:p>
             <a:fld id="{F52FA2A7-1564-41AF-AA2A-65EB1F90CC9B}" type="datetimeFigureOut">
               <a:rPr lang="en-US" smtClean="0"/>
-              <a:t>12/9/2015</a:t>
+              <a:t>12/17/2015</a:t>
             </a:fld>
             <a:endParaRPr lang="en-US"/>
           </a:p>
@@ -4669,7 +4792,7 @@
           <a:p>
             <a:fld id="{F52FA2A7-1564-41AF-AA2A-65EB1F90CC9B}" type="datetimeFigureOut">
               <a:rPr lang="en-US" smtClean="0"/>
-              <a:t>12/9/2015</a:t>
+              <a:t>12/17/2015</a:t>
             </a:fld>
             <a:endParaRPr lang="en-US"/>
           </a:p>
@@ -4974,7 +5097,7 @@
           <a:p>
             <a:fld id="{F52FA2A7-1564-41AF-AA2A-65EB1F90CC9B}" type="datetimeFigureOut">
               <a:rPr lang="en-US" smtClean="0"/>
-              <a:t>12/9/2015</a:t>
+              <a:t>12/17/2015</a:t>
             </a:fld>
             <a:endParaRPr lang="en-US"/>
           </a:p>
@@ -5676,7 +5799,7 @@
           <a:p>
             <a:fld id="{F52FA2A7-1564-41AF-AA2A-65EB1F90CC9B}" type="datetimeFigureOut">
               <a:rPr lang="en-US" smtClean="0"/>
-              <a:t>12/9/2015</a:t>
+              <a:t>12/17/2015</a:t>
             </a:fld>
             <a:endParaRPr lang="en-US"/>
           </a:p>
@@ -6244,11 +6367,7 @@
           <a:p>
             <a:r>
               <a:rPr lang="en-US" dirty="0" smtClean="0"/>
-              <a:t>Lab </a:t>
-            </a:r>
-            <a:r>
-              <a:rPr lang="en-US" dirty="0" smtClean="0"/>
-              <a:t>#6</a:t>
+              <a:t>Lab #6</a:t>
             </a:r>
             <a:endParaRPr lang="en-US" dirty="0"/>
           </a:p>
@@ -6274,6 +6393,1571 @@
 </p:sld>
 </file>
 
+<file path=ppt/slides/slide10.xml><?xml version="1.0" encoding="utf-8"?>
+<p:sld xmlns:a="http://schemas.openxmlformats.org/drawingml/2006/main" xmlns:r="http://schemas.openxmlformats.org/officeDocument/2006/relationships" xmlns:p="http://schemas.openxmlformats.org/presentationml/2006/main">
+  <p:cSld>
+    <p:spTree>
+      <p:nvGrpSpPr>
+        <p:cNvPr id="1" name=""/>
+        <p:cNvGrpSpPr/>
+        <p:nvPr/>
+      </p:nvGrpSpPr>
+      <p:grpSpPr>
+        <a:xfrm>
+          <a:off x="0" y="0"/>
+          <a:ext cx="0" cy="0"/>
+          <a:chOff x="0" y="0"/>
+          <a:chExt cx="0" cy="0"/>
+        </a:xfrm>
+      </p:grpSpPr>
+      <p:sp>
+        <p:nvSpPr>
+          <p:cNvPr id="2" name="Title 1"/>
+          <p:cNvSpPr>
+            <a:spLocks noGrp="1"/>
+          </p:cNvSpPr>
+          <p:nvPr>
+            <p:ph type="title"/>
+          </p:nvPr>
+        </p:nvSpPr>
+        <p:spPr>
+          <a:xfrm>
+            <a:off x="677335" y="609600"/>
+            <a:ext cx="8596668" cy="655782"/>
+          </a:xfrm>
+        </p:spPr>
+        <p:txBody>
+          <a:bodyPr/>
+          <a:lstStyle/>
+          <a:p>
+            <a:r>
+              <a:rPr lang="en-US" dirty="0" smtClean="0"/>
+              <a:t>Kernel Mode Constructs</a:t>
+            </a:r>
+            <a:endParaRPr lang="en-US" dirty="0"/>
+          </a:p>
+        </p:txBody>
+      </p:sp>
+      <p:sp>
+        <p:nvSpPr>
+          <p:cNvPr id="3" name="Content Placeholder 2"/>
+          <p:cNvSpPr>
+            <a:spLocks noGrp="1"/>
+          </p:cNvSpPr>
+          <p:nvPr>
+            <p:ph idx="1"/>
+          </p:nvPr>
+        </p:nvSpPr>
+        <p:spPr>
+          <a:xfrm>
+            <a:off x="677335" y="1533236"/>
+            <a:ext cx="8596668" cy="5324764"/>
+          </a:xfrm>
+        </p:spPr>
+        <p:txBody>
+          <a:bodyPr>
+            <a:normAutofit/>
+          </a:bodyPr>
+          <a:lstStyle/>
+          <a:p>
+            <a:r>
+              <a:rPr lang="en-US" dirty="0" smtClean="0"/>
+              <a:t>Kernel-mode </a:t>
+            </a:r>
+            <a:r>
+              <a:rPr lang="en-US" dirty="0"/>
+              <a:t>constructs are much slower than the user-mode constructs</a:t>
+            </a:r>
+            <a:r>
+              <a:rPr lang="en-US" dirty="0" smtClean="0"/>
+              <a:t>.</a:t>
+            </a:r>
+          </a:p>
+          <a:p>
+            <a:r>
+              <a:rPr lang="en-US" dirty="0"/>
+              <a:t>When a kernel-mode construct detects contention on a resource, Windows blocks the losing thread so that it is not spinning on a CPU, wasting processor </a:t>
+            </a:r>
+            <a:r>
+              <a:rPr lang="en-US" dirty="0" smtClean="0"/>
+              <a:t>resources.</a:t>
+            </a:r>
+          </a:p>
+          <a:p>
+            <a:r>
+              <a:rPr lang="en-US" dirty="0" smtClean="0"/>
+              <a:t>Kernel-mode </a:t>
+            </a:r>
+            <a:r>
+              <a:rPr lang="en-US" dirty="0"/>
+              <a:t>constructs can synchronize native and managed threads with each other. </a:t>
+            </a:r>
+            <a:endParaRPr lang="en-US" dirty="0" smtClean="0"/>
+          </a:p>
+          <a:p>
+            <a:r>
+              <a:rPr lang="en-US" dirty="0" smtClean="0"/>
+              <a:t>Kernel-mode </a:t>
+            </a:r>
+            <a:r>
+              <a:rPr lang="en-US" dirty="0"/>
+              <a:t>constructs can synchronize threads running in different processes on the same </a:t>
+            </a:r>
+            <a:r>
+              <a:rPr lang="en-US" dirty="0" smtClean="0"/>
+              <a:t>machine.</a:t>
+            </a:r>
+          </a:p>
+          <a:p>
+            <a:r>
+              <a:rPr lang="en-US" dirty="0" smtClean="0"/>
+              <a:t>Kernel-mode </a:t>
+            </a:r>
+            <a:r>
+              <a:rPr lang="en-US" dirty="0"/>
+              <a:t>constructs can have security applied to them to prevent unauthorized accounts from accessing </a:t>
+            </a:r>
+            <a:r>
+              <a:rPr lang="en-US" dirty="0" smtClean="0"/>
+              <a:t>them.</a:t>
+            </a:r>
+          </a:p>
+          <a:p>
+            <a:r>
+              <a:rPr lang="en-US" dirty="0" smtClean="0"/>
+              <a:t>A </a:t>
+            </a:r>
+            <a:r>
+              <a:rPr lang="en-US" dirty="0"/>
+              <a:t>thread can block until all kernel-mode constructs in a set are available or until any one kernel-mode construct in a set has become </a:t>
+            </a:r>
+            <a:r>
+              <a:rPr lang="en-US" dirty="0" smtClean="0"/>
+              <a:t>available.</a:t>
+            </a:r>
+          </a:p>
+          <a:p>
+            <a:r>
+              <a:rPr lang="en-US" dirty="0" smtClean="0"/>
+              <a:t>A </a:t>
+            </a:r>
+            <a:r>
+              <a:rPr lang="en-US" dirty="0"/>
+              <a:t>thread can block on a kernel-mode construct specifying a timeout value; if the thread can’t have access to the resource it desires in the specified amount of time, then the thread is unblocked and can perform other tasks. </a:t>
+            </a:r>
+          </a:p>
+        </p:txBody>
+      </p:sp>
+    </p:spTree>
+    <p:extLst>
+      <p:ext uri="{BB962C8B-B14F-4D97-AF65-F5344CB8AC3E}">
+        <p14:creationId xmlns:p14="http://schemas.microsoft.com/office/powerpoint/2010/main" val="3277282197"/>
+      </p:ext>
+    </p:extLst>
+  </p:cSld>
+  <p:clrMapOvr>
+    <a:masterClrMapping/>
+  </p:clrMapOvr>
+</p:sld>
+</file>
+
+<file path=ppt/slides/slide11.xml><?xml version="1.0" encoding="utf-8"?>
+<p:sld xmlns:a="http://schemas.openxmlformats.org/drawingml/2006/main" xmlns:r="http://schemas.openxmlformats.org/officeDocument/2006/relationships" xmlns:p="http://schemas.openxmlformats.org/presentationml/2006/main">
+  <p:cSld>
+    <p:spTree>
+      <p:nvGrpSpPr>
+        <p:cNvPr id="1" name=""/>
+        <p:cNvGrpSpPr/>
+        <p:nvPr/>
+      </p:nvGrpSpPr>
+      <p:grpSpPr>
+        <a:xfrm>
+          <a:off x="0" y="0"/>
+          <a:ext cx="0" cy="0"/>
+          <a:chOff x="0" y="0"/>
+          <a:chExt cx="0" cy="0"/>
+        </a:xfrm>
+      </p:grpSpPr>
+      <p:sp>
+        <p:nvSpPr>
+          <p:cNvPr id="2" name="Title 1"/>
+          <p:cNvSpPr>
+            <a:spLocks noGrp="1"/>
+          </p:cNvSpPr>
+          <p:nvPr>
+            <p:ph type="title"/>
+          </p:nvPr>
+        </p:nvSpPr>
+        <p:spPr>
+          <a:xfrm>
+            <a:off x="677335" y="609600"/>
+            <a:ext cx="8596668" cy="655782"/>
+          </a:xfrm>
+        </p:spPr>
+        <p:txBody>
+          <a:bodyPr/>
+          <a:lstStyle/>
+          <a:p>
+            <a:r>
+              <a:rPr lang="en-US" dirty="0" smtClean="0"/>
+              <a:t>Kernel Mode Constructs</a:t>
+            </a:r>
+            <a:endParaRPr lang="en-US" dirty="0"/>
+          </a:p>
+        </p:txBody>
+      </p:sp>
+      <p:sp>
+        <p:nvSpPr>
+          <p:cNvPr id="3" name="Content Placeholder 2"/>
+          <p:cNvSpPr>
+            <a:spLocks noGrp="1"/>
+          </p:cNvSpPr>
+          <p:nvPr>
+            <p:ph idx="1"/>
+          </p:nvPr>
+        </p:nvSpPr>
+        <p:spPr>
+          <a:xfrm>
+            <a:off x="677335" y="1533236"/>
+            <a:ext cx="8596668" cy="5324764"/>
+          </a:xfrm>
+        </p:spPr>
+        <p:txBody>
+          <a:bodyPr>
+            <a:normAutofit/>
+          </a:bodyPr>
+          <a:lstStyle/>
+          <a:p>
+            <a:r>
+              <a:rPr lang="en-US" dirty="0"/>
+              <a:t>The two primitive kernel-mode thread synchronization constructs are events and semaphores</a:t>
+            </a:r>
+            <a:r>
+              <a:rPr lang="en-US" dirty="0" smtClean="0"/>
+              <a:t>.</a:t>
+            </a:r>
+          </a:p>
+          <a:p>
+            <a:r>
+              <a:rPr lang="en-US" dirty="0" err="1"/>
+              <a:t>WaitHandle</a:t>
+            </a:r>
+            <a:r>
+              <a:rPr lang="en-US" dirty="0"/>
+              <a:t> class is a simple class whose sole purpose is to wrap a Windows kernel object handle. </a:t>
+            </a:r>
+            <a:endParaRPr lang="en-US" dirty="0" smtClean="0"/>
+          </a:p>
+          <a:p>
+            <a:r>
+              <a:rPr lang="en-US" dirty="0"/>
+              <a:t>Every method called on a kernel-mode construct represents a full memory </a:t>
+            </a:r>
+            <a:r>
+              <a:rPr lang="en-US" dirty="0" smtClean="0"/>
+              <a:t>fence.</a:t>
+            </a:r>
+          </a:p>
+          <a:p>
+            <a:r>
+              <a:rPr lang="en-US" dirty="0" smtClean="0"/>
+              <a:t>Public Methods:</a:t>
+            </a:r>
+          </a:p>
+          <a:p>
+            <a:pPr lvl="1"/>
+            <a:r>
+              <a:rPr lang="en-US" dirty="0"/>
+              <a:t>public virtual Boolean </a:t>
+            </a:r>
+            <a:r>
+              <a:rPr lang="en-US" dirty="0" err="1"/>
+              <a:t>WaitOne</a:t>
+            </a:r>
+            <a:r>
+              <a:rPr lang="en-US" dirty="0" smtClean="0"/>
+              <a:t>();</a:t>
+            </a:r>
+          </a:p>
+          <a:p>
+            <a:pPr lvl="1"/>
+            <a:r>
+              <a:rPr lang="en-US" dirty="0" smtClean="0"/>
+              <a:t>public </a:t>
+            </a:r>
+            <a:r>
+              <a:rPr lang="en-US" dirty="0"/>
+              <a:t>virtual Boolean </a:t>
+            </a:r>
+            <a:r>
+              <a:rPr lang="en-US" dirty="0" err="1"/>
+              <a:t>WaitOne</a:t>
+            </a:r>
+            <a:r>
+              <a:rPr lang="en-US" dirty="0"/>
+              <a:t>(Int32 </a:t>
+            </a:r>
+            <a:r>
+              <a:rPr lang="en-US" dirty="0" err="1"/>
+              <a:t>millisecondsTimeout</a:t>
+            </a:r>
+            <a:r>
+              <a:rPr lang="en-US" dirty="0"/>
+              <a:t>); </a:t>
+            </a:r>
+            <a:endParaRPr lang="en-US" dirty="0" smtClean="0"/>
+          </a:p>
+          <a:p>
+            <a:pPr lvl="1"/>
+            <a:r>
+              <a:rPr lang="en-US" dirty="0" smtClean="0"/>
+              <a:t>public </a:t>
+            </a:r>
+            <a:r>
+              <a:rPr lang="en-US" dirty="0"/>
+              <a:t>virtual Boolean </a:t>
+            </a:r>
+            <a:r>
+              <a:rPr lang="en-US" dirty="0" err="1"/>
+              <a:t>WaitOne</a:t>
+            </a:r>
+            <a:r>
+              <a:rPr lang="en-US" dirty="0"/>
+              <a:t>(</a:t>
+            </a:r>
+            <a:r>
+              <a:rPr lang="en-US" dirty="0" err="1"/>
+              <a:t>TimeSpan</a:t>
+            </a:r>
+            <a:r>
+              <a:rPr lang="en-US" dirty="0"/>
+              <a:t> timeout</a:t>
+            </a:r>
+            <a:r>
+              <a:rPr lang="en-US" dirty="0" smtClean="0"/>
+              <a:t>);</a:t>
+            </a:r>
+          </a:p>
+          <a:p>
+            <a:pPr lvl="1"/>
+            <a:r>
+              <a:rPr lang="en-US" dirty="0" smtClean="0"/>
+              <a:t>Public virtual Boolean </a:t>
+            </a:r>
+            <a:r>
+              <a:rPr lang="en-US" dirty="0" err="1" smtClean="0"/>
+              <a:t>WaitAny</a:t>
+            </a:r>
+            <a:r>
+              <a:rPr lang="en-US" dirty="0" smtClean="0"/>
+              <a:t>(…)</a:t>
+            </a:r>
+          </a:p>
+          <a:p>
+            <a:pPr lvl="1"/>
+            <a:r>
+              <a:rPr lang="en-US" dirty="0" smtClean="0"/>
+              <a:t>Public virtual Boolean </a:t>
+            </a:r>
+            <a:r>
+              <a:rPr lang="en-US" dirty="0" err="1" smtClean="0"/>
+              <a:t>WaitAll</a:t>
+            </a:r>
+            <a:r>
+              <a:rPr lang="en-US" dirty="0" smtClean="0"/>
+              <a:t>(…)</a:t>
+            </a:r>
+            <a:endParaRPr lang="en-US" dirty="0"/>
+          </a:p>
+        </p:txBody>
+      </p:sp>
+      <p:sp>
+        <p:nvSpPr>
+          <p:cNvPr id="4" name="Rectangle 3"/>
+          <p:cNvSpPr/>
+          <p:nvPr/>
+        </p:nvSpPr>
+        <p:spPr>
+          <a:xfrm>
+            <a:off x="7352839" y="3318455"/>
+            <a:ext cx="3842327" cy="1754326"/>
+          </a:xfrm>
+          <a:prstGeom prst="rect">
+            <a:avLst/>
+          </a:prstGeom>
+        </p:spPr>
+        <p:txBody>
+          <a:bodyPr wrap="square">
+            <a:spAutoFit/>
+          </a:bodyPr>
+          <a:lstStyle/>
+          <a:p>
+            <a:r>
+              <a:rPr lang="en-US" dirty="0" err="1" smtClean="0"/>
+              <a:t>WaitHandle</a:t>
+            </a:r>
+            <a:r>
+              <a:rPr lang="en-US" dirty="0" smtClean="0"/>
+              <a:t>       </a:t>
+            </a:r>
+          </a:p>
+          <a:p>
+            <a:pPr lvl="1"/>
+            <a:r>
+              <a:rPr lang="en-US" dirty="0" err="1" smtClean="0"/>
+              <a:t>EventWaitHandle</a:t>
+            </a:r>
+            <a:endParaRPr lang="en-US" dirty="0" smtClean="0"/>
+          </a:p>
+          <a:p>
+            <a:pPr lvl="2"/>
+            <a:r>
+              <a:rPr lang="en-US" dirty="0" err="1" smtClean="0"/>
+              <a:t>AutoResetEvent</a:t>
+            </a:r>
+            <a:endParaRPr lang="en-US" dirty="0" smtClean="0"/>
+          </a:p>
+          <a:p>
+            <a:pPr lvl="2"/>
+            <a:r>
+              <a:rPr lang="en-US" dirty="0" err="1" smtClean="0"/>
+              <a:t>ManualResetEvent</a:t>
+            </a:r>
+            <a:endParaRPr lang="en-US" dirty="0" smtClean="0"/>
+          </a:p>
+          <a:p>
+            <a:pPr lvl="1"/>
+            <a:r>
+              <a:rPr lang="en-US" dirty="0" smtClean="0"/>
+              <a:t>Semaphore</a:t>
+            </a:r>
+          </a:p>
+          <a:p>
+            <a:pPr lvl="1"/>
+            <a:r>
+              <a:rPr lang="en-US" dirty="0" err="1" smtClean="0"/>
+              <a:t>Mutex</a:t>
+            </a:r>
+            <a:r>
+              <a:rPr lang="en-US" dirty="0" smtClean="0"/>
+              <a:t> </a:t>
+            </a:r>
+            <a:endParaRPr lang="en-US" dirty="0"/>
+          </a:p>
+        </p:txBody>
+      </p:sp>
+    </p:spTree>
+    <p:extLst>
+      <p:ext uri="{BB962C8B-B14F-4D97-AF65-F5344CB8AC3E}">
+        <p14:creationId xmlns:p14="http://schemas.microsoft.com/office/powerpoint/2010/main" val="1437840222"/>
+      </p:ext>
+    </p:extLst>
+  </p:cSld>
+  <p:clrMapOvr>
+    <a:masterClrMapping/>
+  </p:clrMapOvr>
+</p:sld>
+</file>
+
+<file path=ppt/slides/slide12.xml><?xml version="1.0" encoding="utf-8"?>
+<p:sld xmlns:a="http://schemas.openxmlformats.org/drawingml/2006/main" xmlns:r="http://schemas.openxmlformats.org/officeDocument/2006/relationships" xmlns:p="http://schemas.openxmlformats.org/presentationml/2006/main">
+  <p:cSld>
+    <p:spTree>
+      <p:nvGrpSpPr>
+        <p:cNvPr id="1" name=""/>
+        <p:cNvGrpSpPr/>
+        <p:nvPr/>
+      </p:nvGrpSpPr>
+      <p:grpSpPr>
+        <a:xfrm>
+          <a:off x="0" y="0"/>
+          <a:ext cx="0" cy="0"/>
+          <a:chOff x="0" y="0"/>
+          <a:chExt cx="0" cy="0"/>
+        </a:xfrm>
+      </p:grpSpPr>
+      <p:sp>
+        <p:nvSpPr>
+          <p:cNvPr id="2" name="Title 1"/>
+          <p:cNvSpPr>
+            <a:spLocks noGrp="1"/>
+          </p:cNvSpPr>
+          <p:nvPr>
+            <p:ph type="title"/>
+          </p:nvPr>
+        </p:nvSpPr>
+        <p:spPr>
+          <a:xfrm>
+            <a:off x="677335" y="609600"/>
+            <a:ext cx="8596668" cy="655782"/>
+          </a:xfrm>
+        </p:spPr>
+        <p:txBody>
+          <a:bodyPr/>
+          <a:lstStyle/>
+          <a:p>
+            <a:r>
+              <a:rPr lang="en-US" dirty="0" smtClean="0"/>
+              <a:t>Kernel Mode Constructs</a:t>
+            </a:r>
+            <a:endParaRPr lang="en-US" dirty="0"/>
+          </a:p>
+        </p:txBody>
+      </p:sp>
+      <p:sp>
+        <p:nvSpPr>
+          <p:cNvPr id="3" name="Content Placeholder 2"/>
+          <p:cNvSpPr>
+            <a:spLocks noGrp="1"/>
+          </p:cNvSpPr>
+          <p:nvPr>
+            <p:ph idx="1"/>
+          </p:nvPr>
+        </p:nvSpPr>
+        <p:spPr>
+          <a:xfrm>
+            <a:off x="677335" y="1533236"/>
+            <a:ext cx="8596668" cy="5324764"/>
+          </a:xfrm>
+        </p:spPr>
+        <p:txBody>
+          <a:bodyPr>
+            <a:normAutofit fontScale="92500" lnSpcReduction="10000"/>
+          </a:bodyPr>
+          <a:lstStyle/>
+          <a:p>
+            <a:r>
+              <a:rPr lang="en-US" dirty="0" err="1" smtClean="0"/>
+              <a:t>WaitHandle’s</a:t>
+            </a:r>
+            <a:r>
+              <a:rPr lang="en-US" dirty="0" smtClean="0"/>
+              <a:t> </a:t>
+            </a:r>
+            <a:r>
+              <a:rPr lang="en-US" dirty="0" err="1"/>
+              <a:t>WaitOne</a:t>
+            </a:r>
+            <a:r>
+              <a:rPr lang="en-US" dirty="0"/>
+              <a:t> method to have the calling thread wait for the underlying kernel object to become signaled. Internally, this method calls the Win32 </a:t>
+            </a:r>
+            <a:r>
+              <a:rPr lang="en-US" dirty="0" err="1"/>
+              <a:t>WaitForSingleObjectEx</a:t>
+            </a:r>
+            <a:r>
+              <a:rPr lang="en-US" dirty="0"/>
+              <a:t> function. The returned Boolean is true if the object became signaled or false if a timeout </a:t>
+            </a:r>
+            <a:r>
+              <a:rPr lang="en-US" dirty="0" smtClean="0"/>
+              <a:t>occurs.</a:t>
+            </a:r>
+          </a:p>
+          <a:p>
+            <a:r>
+              <a:rPr lang="en-US" dirty="0" err="1" smtClean="0"/>
+              <a:t>WaitHandle’s</a:t>
+            </a:r>
+            <a:r>
+              <a:rPr lang="en-US" dirty="0" smtClean="0"/>
+              <a:t> </a:t>
+            </a:r>
+            <a:r>
+              <a:rPr lang="en-US" dirty="0"/>
+              <a:t>static </a:t>
+            </a:r>
+            <a:r>
+              <a:rPr lang="en-US" dirty="0" err="1"/>
+              <a:t>WaitAll</a:t>
+            </a:r>
+            <a:r>
+              <a:rPr lang="en-US" dirty="0"/>
+              <a:t> method </a:t>
+            </a:r>
+            <a:r>
+              <a:rPr lang="en-US" dirty="0" smtClean="0"/>
+              <a:t>has </a:t>
+            </a:r>
+            <a:r>
+              <a:rPr lang="en-US" dirty="0"/>
+              <a:t>the calling thread wait for all the kernel objects specified in the </a:t>
+            </a:r>
+            <a:r>
+              <a:rPr lang="en-US" dirty="0" err="1"/>
+              <a:t>WaitHandle</a:t>
+            </a:r>
+            <a:r>
+              <a:rPr lang="en-US" dirty="0"/>
+              <a:t>[] to become signaled. The returned Boolean is true if all of the objects became signaled or false if a timeout occurs. Internally, this method calls the Win32 </a:t>
+            </a:r>
+            <a:r>
+              <a:rPr lang="en-US" dirty="0" err="1"/>
+              <a:t>WaitForMultipleObjectsEx</a:t>
+            </a:r>
+            <a:r>
+              <a:rPr lang="en-US" dirty="0"/>
+              <a:t> function, passing TRUE for the </a:t>
+            </a:r>
+            <a:r>
+              <a:rPr lang="en-US" dirty="0" err="1"/>
+              <a:t>bWaitAll</a:t>
+            </a:r>
+            <a:r>
+              <a:rPr lang="en-US" dirty="0"/>
+              <a:t> </a:t>
+            </a:r>
+            <a:r>
+              <a:rPr lang="en-US" dirty="0" smtClean="0"/>
+              <a:t>parameter.</a:t>
+            </a:r>
+          </a:p>
+          <a:p>
+            <a:r>
+              <a:rPr lang="en-US" dirty="0" err="1" smtClean="0"/>
+              <a:t>WaitHandle’s</a:t>
+            </a:r>
+            <a:r>
+              <a:rPr lang="en-US" dirty="0" smtClean="0"/>
+              <a:t> </a:t>
+            </a:r>
+            <a:r>
+              <a:rPr lang="en-US" dirty="0"/>
+              <a:t>static </a:t>
+            </a:r>
+            <a:r>
+              <a:rPr lang="en-US" dirty="0" err="1"/>
+              <a:t>WaitAny</a:t>
+            </a:r>
+            <a:r>
+              <a:rPr lang="en-US" dirty="0"/>
+              <a:t> method to have the calling thread wait for any one of the kernel objects specified in the </a:t>
+            </a:r>
+            <a:r>
+              <a:rPr lang="en-US" dirty="0" err="1"/>
+              <a:t>WaitHandle</a:t>
+            </a:r>
+            <a:r>
+              <a:rPr lang="en-US" dirty="0"/>
+              <a:t>[] to become signaled. The returned Int32 is the index of the array element corresponding to the kernel object that became signaled, or </a:t>
+            </a:r>
+            <a:r>
+              <a:rPr lang="en-US" dirty="0" err="1"/>
+              <a:t>WaitHandle.WaitTimeout</a:t>
+            </a:r>
+            <a:r>
+              <a:rPr lang="en-US" dirty="0"/>
+              <a:t> if no object became signaled while waiting. Internally, this method calls the Win32 </a:t>
+            </a:r>
+            <a:r>
+              <a:rPr lang="en-US" dirty="0" err="1"/>
+              <a:t>WaitForMultipleObjectsEx</a:t>
+            </a:r>
+            <a:r>
+              <a:rPr lang="en-US" dirty="0"/>
+              <a:t> function, passing FALSE for the </a:t>
+            </a:r>
+            <a:r>
+              <a:rPr lang="en-US" dirty="0" err="1"/>
+              <a:t>bWaitAll</a:t>
+            </a:r>
+            <a:r>
+              <a:rPr lang="en-US" dirty="0"/>
+              <a:t> </a:t>
+            </a:r>
+            <a:r>
+              <a:rPr lang="en-US" dirty="0" smtClean="0"/>
+              <a:t>parameter.</a:t>
+            </a:r>
+          </a:p>
+          <a:p>
+            <a:r>
+              <a:rPr lang="en-US" dirty="0" err="1" smtClean="0"/>
+              <a:t>WaitHandle’s</a:t>
+            </a:r>
+            <a:r>
+              <a:rPr lang="en-US" dirty="0" smtClean="0"/>
+              <a:t> </a:t>
+            </a:r>
+            <a:r>
+              <a:rPr lang="en-US" dirty="0"/>
+              <a:t>Dispose method to close the underlying kernel object handle. Internally, these methods call the Win32 </a:t>
+            </a:r>
+            <a:r>
+              <a:rPr lang="en-US" dirty="0" err="1"/>
+              <a:t>CloseHandle</a:t>
+            </a:r>
+            <a:r>
+              <a:rPr lang="en-US" dirty="0"/>
+              <a:t> function. You can only call Dispose explicitly in your code if you know for a fact that no other threads are using the kernel object</a:t>
+            </a:r>
+            <a:r>
+              <a:rPr lang="en-US" dirty="0" smtClean="0"/>
+              <a:t>.</a:t>
+            </a:r>
+            <a:endParaRPr lang="en-US" dirty="0"/>
+          </a:p>
+        </p:txBody>
+      </p:sp>
+    </p:spTree>
+    <p:extLst>
+      <p:ext uri="{BB962C8B-B14F-4D97-AF65-F5344CB8AC3E}">
+        <p14:creationId xmlns:p14="http://schemas.microsoft.com/office/powerpoint/2010/main" val="2105786219"/>
+      </p:ext>
+    </p:extLst>
+  </p:cSld>
+  <p:clrMapOvr>
+    <a:masterClrMapping/>
+  </p:clrMapOvr>
+</p:sld>
+</file>
+
+<file path=ppt/slides/slide13.xml><?xml version="1.0" encoding="utf-8"?>
+<p:sld xmlns:a="http://schemas.openxmlformats.org/drawingml/2006/main" xmlns:r="http://schemas.openxmlformats.org/officeDocument/2006/relationships" xmlns:p="http://schemas.openxmlformats.org/presentationml/2006/main">
+  <p:cSld>
+    <p:spTree>
+      <p:nvGrpSpPr>
+        <p:cNvPr id="1" name=""/>
+        <p:cNvGrpSpPr/>
+        <p:nvPr/>
+      </p:nvGrpSpPr>
+      <p:grpSpPr>
+        <a:xfrm>
+          <a:off x="0" y="0"/>
+          <a:ext cx="0" cy="0"/>
+          <a:chOff x="0" y="0"/>
+          <a:chExt cx="0" cy="0"/>
+        </a:xfrm>
+      </p:grpSpPr>
+      <p:sp>
+        <p:nvSpPr>
+          <p:cNvPr id="2" name="Title 1"/>
+          <p:cNvSpPr>
+            <a:spLocks noGrp="1"/>
+          </p:cNvSpPr>
+          <p:nvPr>
+            <p:ph type="title"/>
+          </p:nvPr>
+        </p:nvSpPr>
+        <p:spPr>
+          <a:xfrm>
+            <a:off x="677335" y="609600"/>
+            <a:ext cx="8596668" cy="655782"/>
+          </a:xfrm>
+        </p:spPr>
+        <p:txBody>
+          <a:bodyPr/>
+          <a:lstStyle/>
+          <a:p>
+            <a:r>
+              <a:rPr lang="en-US" dirty="0" smtClean="0"/>
+              <a:t>Kernel Mode Constructs</a:t>
+            </a:r>
+            <a:endParaRPr lang="en-US" dirty="0"/>
+          </a:p>
+        </p:txBody>
+      </p:sp>
+      <p:sp>
+        <p:nvSpPr>
+          <p:cNvPr id="3" name="Content Placeholder 2"/>
+          <p:cNvSpPr>
+            <a:spLocks noGrp="1"/>
+          </p:cNvSpPr>
+          <p:nvPr>
+            <p:ph idx="1"/>
+          </p:nvPr>
+        </p:nvSpPr>
+        <p:spPr>
+          <a:xfrm>
+            <a:off x="677335" y="1533236"/>
+            <a:ext cx="8596668" cy="5324764"/>
+          </a:xfrm>
+        </p:spPr>
+        <p:txBody>
+          <a:bodyPr>
+            <a:normAutofit/>
+          </a:bodyPr>
+          <a:lstStyle/>
+          <a:p>
+            <a:r>
+              <a:rPr lang="en-US" b="1" dirty="0" err="1"/>
+              <a:t>AutoResetEvent</a:t>
+            </a:r>
+            <a:r>
+              <a:rPr lang="en-US" dirty="0"/>
+              <a:t>, </a:t>
+            </a:r>
+            <a:r>
+              <a:rPr lang="en-US" b="1" dirty="0" err="1"/>
+              <a:t>ManualResetEvent</a:t>
+            </a:r>
+            <a:r>
+              <a:rPr lang="en-US" dirty="0"/>
+              <a:t>, </a:t>
+            </a:r>
+            <a:r>
+              <a:rPr lang="en-US" b="1" dirty="0"/>
+              <a:t>Semaphore</a:t>
+            </a:r>
+            <a:r>
+              <a:rPr lang="en-US" dirty="0"/>
+              <a:t>, and </a:t>
+            </a:r>
+            <a:r>
+              <a:rPr lang="en-US" b="1" dirty="0" err="1"/>
+              <a:t>Mutex</a:t>
+            </a:r>
+            <a:r>
+              <a:rPr lang="en-US" dirty="0"/>
+              <a:t> classes are all derived from </a:t>
+            </a:r>
+            <a:r>
+              <a:rPr lang="en-US" b="1" dirty="0" err="1" smtClean="0"/>
+              <a:t>WaitHandle</a:t>
+            </a:r>
+            <a:r>
+              <a:rPr lang="en-US" b="1" dirty="0" smtClean="0"/>
+              <a:t>.</a:t>
+            </a:r>
+          </a:p>
+          <a:p>
+            <a:r>
+              <a:rPr lang="en-US" dirty="0" smtClean="0"/>
+              <a:t>Constructors </a:t>
+            </a:r>
+            <a:r>
+              <a:rPr lang="en-US" dirty="0"/>
+              <a:t>for all of these classes internally call the Win32 </a:t>
+            </a:r>
+            <a:r>
+              <a:rPr lang="en-US" b="1" dirty="0" err="1"/>
+              <a:t>CreateEvent</a:t>
+            </a:r>
+            <a:r>
+              <a:rPr lang="en-US" dirty="0"/>
+              <a:t> (passing FALSE for the </a:t>
+            </a:r>
+            <a:r>
+              <a:rPr lang="en-US" dirty="0" err="1"/>
+              <a:t>bManualReset</a:t>
+            </a:r>
+            <a:r>
+              <a:rPr lang="en-US" dirty="0"/>
+              <a:t> parameter) or </a:t>
+            </a:r>
+            <a:r>
+              <a:rPr lang="en-US" b="1" dirty="0" err="1"/>
+              <a:t>CreateEvent</a:t>
+            </a:r>
+            <a:r>
+              <a:rPr lang="en-US" dirty="0"/>
+              <a:t> (passing TRUE for the </a:t>
+            </a:r>
+            <a:r>
+              <a:rPr lang="en-US" dirty="0" err="1"/>
+              <a:t>bManualReset</a:t>
+            </a:r>
+            <a:r>
+              <a:rPr lang="en-US" dirty="0"/>
+              <a:t> parameter), </a:t>
+            </a:r>
+            <a:r>
+              <a:rPr lang="en-US" b="1" dirty="0" err="1"/>
+              <a:t>CreateSemaphore</a:t>
+            </a:r>
+            <a:r>
+              <a:rPr lang="en-US" dirty="0"/>
+              <a:t>, or </a:t>
+            </a:r>
+            <a:r>
+              <a:rPr lang="en-US" b="1" dirty="0" err="1"/>
+              <a:t>CreateMutex</a:t>
+            </a:r>
+            <a:r>
+              <a:rPr lang="en-US" dirty="0"/>
+              <a:t> functions. The handle value returned from all of these calls is saved in a private </a:t>
+            </a:r>
+            <a:r>
+              <a:rPr lang="en-US" dirty="0" err="1"/>
+              <a:t>SafeWaitHandle</a:t>
+            </a:r>
+            <a:r>
+              <a:rPr lang="en-US" dirty="0"/>
+              <a:t> field defined inside the </a:t>
+            </a:r>
+            <a:r>
+              <a:rPr lang="en-US" dirty="0" err="1"/>
+              <a:t>WaitHandle</a:t>
+            </a:r>
+            <a:r>
+              <a:rPr lang="en-US" dirty="0"/>
+              <a:t> base class</a:t>
+            </a:r>
+            <a:r>
+              <a:rPr lang="en-US" dirty="0" smtClean="0"/>
+              <a:t>.</a:t>
+            </a:r>
+          </a:p>
+          <a:p>
+            <a:r>
+              <a:rPr lang="en-US" b="1" dirty="0" err="1" smtClean="0"/>
+              <a:t>EventWaitHandle</a:t>
+            </a:r>
+            <a:r>
+              <a:rPr lang="en-US" dirty="0"/>
+              <a:t>, </a:t>
+            </a:r>
+            <a:r>
+              <a:rPr lang="en-US" b="1" dirty="0"/>
+              <a:t>Semaphore</a:t>
+            </a:r>
+            <a:r>
+              <a:rPr lang="en-US" dirty="0"/>
+              <a:t>, and </a:t>
+            </a:r>
+            <a:r>
+              <a:rPr lang="en-US" b="1" dirty="0" err="1"/>
+              <a:t>Mutex</a:t>
+            </a:r>
+            <a:r>
+              <a:rPr lang="en-US" dirty="0"/>
+              <a:t> classes all offer static </a:t>
+            </a:r>
+            <a:r>
+              <a:rPr lang="en-US" b="1" dirty="0" err="1"/>
+              <a:t>OpenExisting</a:t>
+            </a:r>
+            <a:r>
+              <a:rPr lang="en-US" dirty="0"/>
+              <a:t> methods, which internally call the Win32 </a:t>
+            </a:r>
+            <a:r>
+              <a:rPr lang="en-US" b="1" dirty="0" err="1"/>
+              <a:t>OpenEvent</a:t>
+            </a:r>
+            <a:r>
+              <a:rPr lang="en-US" dirty="0"/>
+              <a:t>, </a:t>
+            </a:r>
+            <a:r>
+              <a:rPr lang="en-US" b="1" dirty="0" err="1"/>
+              <a:t>OpenSemaphore</a:t>
+            </a:r>
+            <a:r>
+              <a:rPr lang="en-US" dirty="0"/>
+              <a:t>, or </a:t>
+            </a:r>
+            <a:r>
+              <a:rPr lang="en-US" b="1" dirty="0" err="1"/>
+              <a:t>OpenMutex</a:t>
+            </a:r>
+            <a:r>
+              <a:rPr lang="en-US" dirty="0"/>
+              <a:t> functions, passing a String argument that identifies an existing named kernel object. The handle value returned from all of these functions is saved in a newly constructed object that is returned from the </a:t>
+            </a:r>
+            <a:r>
+              <a:rPr lang="en-US" b="1" dirty="0" err="1"/>
+              <a:t>OpenExisting</a:t>
+            </a:r>
+            <a:r>
+              <a:rPr lang="en-US" dirty="0"/>
+              <a:t> method. If no kernel object exists with the specified name, a </a:t>
+            </a:r>
+            <a:r>
+              <a:rPr lang="en-US" b="1" dirty="0" err="1"/>
+              <a:t>WaitHandleCannotBeOpenedException</a:t>
+            </a:r>
+            <a:r>
+              <a:rPr lang="en-US" dirty="0"/>
+              <a:t> is thrown. </a:t>
+            </a:r>
+          </a:p>
+        </p:txBody>
+      </p:sp>
+    </p:spTree>
+    <p:extLst>
+      <p:ext uri="{BB962C8B-B14F-4D97-AF65-F5344CB8AC3E}">
+        <p14:creationId xmlns:p14="http://schemas.microsoft.com/office/powerpoint/2010/main" val="224933505"/>
+      </p:ext>
+    </p:extLst>
+  </p:cSld>
+  <p:clrMapOvr>
+    <a:masterClrMapping/>
+  </p:clrMapOvr>
+</p:sld>
+</file>
+
+<file path=ppt/slides/slide14.xml><?xml version="1.0" encoding="utf-8"?>
+<p:sld xmlns:a="http://schemas.openxmlformats.org/drawingml/2006/main" xmlns:r="http://schemas.openxmlformats.org/officeDocument/2006/relationships" xmlns:p="http://schemas.openxmlformats.org/presentationml/2006/main">
+  <p:cSld>
+    <p:spTree>
+      <p:nvGrpSpPr>
+        <p:cNvPr id="1" name=""/>
+        <p:cNvGrpSpPr/>
+        <p:nvPr/>
+      </p:nvGrpSpPr>
+      <p:grpSpPr>
+        <a:xfrm>
+          <a:off x="0" y="0"/>
+          <a:ext cx="0" cy="0"/>
+          <a:chOff x="0" y="0"/>
+          <a:chExt cx="0" cy="0"/>
+        </a:xfrm>
+      </p:grpSpPr>
+      <p:sp>
+        <p:nvSpPr>
+          <p:cNvPr id="2" name="Title 1"/>
+          <p:cNvSpPr>
+            <a:spLocks noGrp="1"/>
+          </p:cNvSpPr>
+          <p:nvPr>
+            <p:ph type="title"/>
+          </p:nvPr>
+        </p:nvSpPr>
+        <p:spPr>
+          <a:xfrm>
+            <a:off x="677335" y="609600"/>
+            <a:ext cx="8596668" cy="711200"/>
+          </a:xfrm>
+        </p:spPr>
+        <p:txBody>
+          <a:bodyPr>
+            <a:normAutofit/>
+          </a:bodyPr>
+          <a:lstStyle/>
+          <a:p>
+            <a:r>
+              <a:rPr lang="en-US" dirty="0" smtClean="0"/>
+              <a:t>Event Constructs</a:t>
+            </a:r>
+            <a:endParaRPr lang="en-US" dirty="0"/>
+          </a:p>
+        </p:txBody>
+      </p:sp>
+      <p:sp>
+        <p:nvSpPr>
+          <p:cNvPr id="3" name="Content Placeholder 2"/>
+          <p:cNvSpPr>
+            <a:spLocks noGrp="1"/>
+          </p:cNvSpPr>
+          <p:nvPr>
+            <p:ph idx="1"/>
+          </p:nvPr>
+        </p:nvSpPr>
+        <p:spPr>
+          <a:xfrm>
+            <a:off x="677335" y="1496291"/>
+            <a:ext cx="8596668" cy="5246253"/>
+          </a:xfrm>
+        </p:spPr>
+        <p:txBody>
+          <a:bodyPr>
+            <a:normAutofit/>
+          </a:bodyPr>
+          <a:lstStyle/>
+          <a:p>
+            <a:r>
+              <a:rPr lang="en-US" dirty="0"/>
+              <a:t>Events are simply Boolean variables maintained by the kernel. </a:t>
+            </a:r>
+            <a:endParaRPr lang="en-US" dirty="0" smtClean="0"/>
+          </a:p>
+          <a:p>
+            <a:r>
+              <a:rPr lang="en-US" dirty="0"/>
+              <a:t>A thread waiting on an event blocks when the event is false and unblocks when the event is true</a:t>
+            </a:r>
+            <a:r>
+              <a:rPr lang="en-US" dirty="0" smtClean="0"/>
+              <a:t>.</a:t>
+            </a:r>
+          </a:p>
+          <a:p>
+            <a:r>
+              <a:rPr lang="en-US" dirty="0"/>
+              <a:t>When an </a:t>
+            </a:r>
+            <a:r>
+              <a:rPr lang="en-US" b="1" dirty="0"/>
+              <a:t>auto-reset</a:t>
+            </a:r>
+            <a:r>
+              <a:rPr lang="en-US" dirty="0"/>
+              <a:t> event is true, it wakes up just one blocked thread, because the kernel automatically resets the event back to false after unblocking the first </a:t>
+            </a:r>
+            <a:r>
+              <a:rPr lang="en-US" dirty="0" smtClean="0"/>
+              <a:t>thread</a:t>
+            </a:r>
+          </a:p>
+          <a:p>
+            <a:r>
+              <a:rPr lang="en-US" dirty="0" smtClean="0"/>
+              <a:t>When </a:t>
+            </a:r>
+            <a:r>
+              <a:rPr lang="en-US" dirty="0"/>
+              <a:t>a </a:t>
+            </a:r>
+            <a:r>
+              <a:rPr lang="en-US" b="1" dirty="0"/>
+              <a:t>manual-reset</a:t>
+            </a:r>
+            <a:r>
+              <a:rPr lang="en-US" dirty="0"/>
+              <a:t> event is true, it unblocks all threads waiting for it because the kernel does not automatically reset the event back to false; your code must manually reset the event back to false. </a:t>
+            </a:r>
+            <a:endParaRPr lang="en-US" dirty="0" smtClean="0"/>
+          </a:p>
+          <a:p>
+            <a:r>
+              <a:rPr lang="en-US" dirty="0"/>
+              <a:t>Demo </a:t>
+            </a:r>
+            <a:r>
+              <a:rPr lang="en-US" b="1" dirty="0" err="1" smtClean="0"/>
+              <a:t>SimpleWaitLock</a:t>
+            </a:r>
+            <a:r>
+              <a:rPr lang="en-US" dirty="0" smtClean="0"/>
+              <a:t>.</a:t>
+            </a:r>
+          </a:p>
+          <a:p>
+            <a:r>
+              <a:rPr lang="en-US" dirty="0"/>
+              <a:t>When there is no contention on the lock, the </a:t>
+            </a:r>
+            <a:r>
+              <a:rPr lang="en-US" b="1" dirty="0" err="1"/>
+              <a:t>SimpleWaitLock</a:t>
+            </a:r>
+            <a:r>
+              <a:rPr lang="en-US" dirty="0"/>
+              <a:t> is much slower than the </a:t>
+            </a:r>
+            <a:r>
+              <a:rPr lang="en-US" b="1" dirty="0" err="1"/>
+              <a:t>SimpleSpinLock</a:t>
+            </a:r>
+            <a:r>
+              <a:rPr lang="en-US" dirty="0"/>
+              <a:t>, because every call to </a:t>
+            </a:r>
+            <a:r>
+              <a:rPr lang="en-US" b="1" dirty="0" err="1"/>
+              <a:t>SimpleWaitLock’s</a:t>
+            </a:r>
+            <a:r>
+              <a:rPr lang="en-US" dirty="0"/>
+              <a:t> Enter and Leave methods forces the calling thread to transition from managed code to the kernel and back—which is bad. But when there is contention, the losing thread is blocked by the kernel and is not spinning and wasting CPU cycles—which is good.</a:t>
+            </a:r>
+          </a:p>
+        </p:txBody>
+      </p:sp>
+    </p:spTree>
+    <p:extLst>
+      <p:ext uri="{BB962C8B-B14F-4D97-AF65-F5344CB8AC3E}">
+        <p14:creationId xmlns:p14="http://schemas.microsoft.com/office/powerpoint/2010/main" val="2441317685"/>
+      </p:ext>
+    </p:extLst>
+  </p:cSld>
+  <p:clrMapOvr>
+    <a:masterClrMapping/>
+  </p:clrMapOvr>
+</p:sld>
+</file>
+
+<file path=ppt/slides/slide15.xml><?xml version="1.0" encoding="utf-8"?>
+<p:sld xmlns:a="http://schemas.openxmlformats.org/drawingml/2006/main" xmlns:r="http://schemas.openxmlformats.org/officeDocument/2006/relationships" xmlns:p="http://schemas.openxmlformats.org/presentationml/2006/main">
+  <p:cSld>
+    <p:spTree>
+      <p:nvGrpSpPr>
+        <p:cNvPr id="1" name=""/>
+        <p:cNvGrpSpPr/>
+        <p:nvPr/>
+      </p:nvGrpSpPr>
+      <p:grpSpPr>
+        <a:xfrm>
+          <a:off x="0" y="0"/>
+          <a:ext cx="0" cy="0"/>
+          <a:chOff x="0" y="0"/>
+          <a:chExt cx="0" cy="0"/>
+        </a:xfrm>
+      </p:grpSpPr>
+      <p:sp>
+        <p:nvSpPr>
+          <p:cNvPr id="2" name="Title 1"/>
+          <p:cNvSpPr>
+            <a:spLocks noGrp="1"/>
+          </p:cNvSpPr>
+          <p:nvPr>
+            <p:ph type="title"/>
+          </p:nvPr>
+        </p:nvSpPr>
+        <p:spPr>
+          <a:xfrm>
+            <a:off x="677335" y="609600"/>
+            <a:ext cx="8596668" cy="766618"/>
+          </a:xfrm>
+        </p:spPr>
+        <p:txBody>
+          <a:bodyPr>
+            <a:normAutofit/>
+          </a:bodyPr>
+          <a:lstStyle/>
+          <a:p>
+            <a:r>
+              <a:rPr lang="en-US" dirty="0"/>
+              <a:t>Semaphore Constructs </a:t>
+            </a:r>
+          </a:p>
+        </p:txBody>
+      </p:sp>
+      <p:sp>
+        <p:nvSpPr>
+          <p:cNvPr id="3" name="Content Placeholder 2"/>
+          <p:cNvSpPr>
+            <a:spLocks noGrp="1"/>
+          </p:cNvSpPr>
+          <p:nvPr>
+            <p:ph idx="1"/>
+          </p:nvPr>
+        </p:nvSpPr>
+        <p:spPr>
+          <a:xfrm>
+            <a:off x="677335" y="1597892"/>
+            <a:ext cx="8596668" cy="4443472"/>
+          </a:xfrm>
+        </p:spPr>
+        <p:txBody>
+          <a:bodyPr/>
+          <a:lstStyle/>
+          <a:p>
+            <a:r>
+              <a:rPr lang="en-US" dirty="0"/>
+              <a:t>Semaphores are simply Int32 variables maintained by the </a:t>
+            </a:r>
+            <a:r>
+              <a:rPr lang="en-US" dirty="0" smtClean="0"/>
+              <a:t>kernel.</a:t>
+            </a:r>
+          </a:p>
+          <a:p>
+            <a:r>
+              <a:rPr lang="en-US" dirty="0"/>
+              <a:t>A thread waiting on a semaphore blocks when the semaphore is 0 and unblocks when the semaphore is greater than 0. When a thread waiting on a semaphore unblocks, the kernel automatically subtracts 1 from the semaphore’s count. Semaphores also have a maximum Int32 value associated with them, and the current count is never allowed to go over the maximum count. </a:t>
+            </a:r>
+            <a:endParaRPr lang="en-US" dirty="0" smtClean="0"/>
+          </a:p>
+          <a:p>
+            <a:r>
+              <a:rPr lang="en-US" dirty="0" smtClean="0"/>
+              <a:t>Demo.</a:t>
+            </a:r>
+            <a:endParaRPr lang="en-US" dirty="0"/>
+          </a:p>
+        </p:txBody>
+      </p:sp>
+    </p:spTree>
+    <p:extLst>
+      <p:ext uri="{BB962C8B-B14F-4D97-AF65-F5344CB8AC3E}">
+        <p14:creationId xmlns:p14="http://schemas.microsoft.com/office/powerpoint/2010/main" val="1218772020"/>
+      </p:ext>
+    </p:extLst>
+  </p:cSld>
+  <p:clrMapOvr>
+    <a:masterClrMapping/>
+  </p:clrMapOvr>
+</p:sld>
+</file>
+
+<file path=ppt/slides/slide16.xml><?xml version="1.0" encoding="utf-8"?>
+<p:sld xmlns:a="http://schemas.openxmlformats.org/drawingml/2006/main" xmlns:r="http://schemas.openxmlformats.org/officeDocument/2006/relationships" xmlns:p="http://schemas.openxmlformats.org/presentationml/2006/main">
+  <p:cSld>
+    <p:spTree>
+      <p:nvGrpSpPr>
+        <p:cNvPr id="1" name=""/>
+        <p:cNvGrpSpPr/>
+        <p:nvPr/>
+      </p:nvGrpSpPr>
+      <p:grpSpPr>
+        <a:xfrm>
+          <a:off x="0" y="0"/>
+          <a:ext cx="0" cy="0"/>
+          <a:chOff x="0" y="0"/>
+          <a:chExt cx="0" cy="0"/>
+        </a:xfrm>
+      </p:grpSpPr>
+      <p:sp>
+        <p:nvSpPr>
+          <p:cNvPr id="2" name="Title 1"/>
+          <p:cNvSpPr>
+            <a:spLocks noGrp="1"/>
+          </p:cNvSpPr>
+          <p:nvPr>
+            <p:ph type="title"/>
+          </p:nvPr>
+        </p:nvSpPr>
+        <p:spPr>
+          <a:xfrm>
+            <a:off x="677335" y="609600"/>
+            <a:ext cx="8596668" cy="734458"/>
+          </a:xfrm>
+        </p:spPr>
+        <p:txBody>
+          <a:bodyPr/>
+          <a:lstStyle/>
+          <a:p>
+            <a:r>
+              <a:rPr lang="en-US" dirty="0" err="1"/>
+              <a:t>Mutex</a:t>
+            </a:r>
+            <a:r>
+              <a:rPr lang="en-US" dirty="0"/>
+              <a:t> Constructs</a:t>
+            </a:r>
+          </a:p>
+        </p:txBody>
+      </p:sp>
+      <p:sp>
+        <p:nvSpPr>
+          <p:cNvPr id="3" name="Content Placeholder 2"/>
+          <p:cNvSpPr>
+            <a:spLocks noGrp="1"/>
+          </p:cNvSpPr>
+          <p:nvPr>
+            <p:ph idx="1"/>
+          </p:nvPr>
+        </p:nvSpPr>
+        <p:spPr>
+          <a:xfrm>
+            <a:off x="677334" y="1344058"/>
+            <a:ext cx="9149711" cy="5513942"/>
+          </a:xfrm>
+        </p:spPr>
+        <p:txBody>
+          <a:bodyPr/>
+          <a:lstStyle/>
+          <a:p>
+            <a:r>
+              <a:rPr lang="en-US" dirty="0"/>
+              <a:t>A </a:t>
+            </a:r>
+            <a:r>
+              <a:rPr lang="en-US" b="1" dirty="0" err="1"/>
+              <a:t>Mutex</a:t>
+            </a:r>
+            <a:r>
+              <a:rPr lang="en-US" dirty="0"/>
+              <a:t> represents a mutual-exclusive lock. It works similar to an </a:t>
+            </a:r>
+            <a:r>
+              <a:rPr lang="en-US" b="1" dirty="0" err="1"/>
+              <a:t>AutoResetEvent</a:t>
+            </a:r>
+            <a:r>
+              <a:rPr lang="en-US" dirty="0"/>
+              <a:t> or a </a:t>
+            </a:r>
+            <a:r>
+              <a:rPr lang="en-US" b="1" dirty="0"/>
+              <a:t>Semaphore</a:t>
+            </a:r>
+            <a:r>
+              <a:rPr lang="en-US" dirty="0"/>
+              <a:t> with a count of 1 since all three constructs release only one waiting thread at a time</a:t>
+            </a:r>
+            <a:r>
+              <a:rPr lang="en-US" dirty="0" smtClean="0"/>
+              <a:t>.</a:t>
+            </a:r>
+          </a:p>
+          <a:p>
+            <a:r>
+              <a:rPr lang="en-US" b="1" dirty="0" err="1"/>
+              <a:t>Mutex</a:t>
+            </a:r>
+            <a:r>
+              <a:rPr lang="en-US" dirty="0"/>
+              <a:t> objects record which thread obtained it by querying the calling thread’s Int32 </a:t>
+            </a:r>
+            <a:r>
+              <a:rPr lang="en-US" dirty="0" smtClean="0"/>
+              <a:t>ID</a:t>
+            </a:r>
+            <a:r>
+              <a:rPr lang="en-US" dirty="0"/>
+              <a:t>. When a thread calls </a:t>
+            </a:r>
+            <a:r>
+              <a:rPr lang="en-US" b="1" dirty="0" err="1"/>
+              <a:t>ReleaseMutex</a:t>
+            </a:r>
+            <a:r>
+              <a:rPr lang="en-US" dirty="0"/>
+              <a:t>, the </a:t>
+            </a:r>
+            <a:r>
+              <a:rPr lang="en-US" b="1" dirty="0" err="1"/>
+              <a:t>Mutex</a:t>
+            </a:r>
+            <a:r>
+              <a:rPr lang="en-US" dirty="0"/>
+              <a:t> makes sure that the calling thread is the same thread that obtained the </a:t>
+            </a:r>
+            <a:r>
+              <a:rPr lang="en-US" b="1" dirty="0" err="1"/>
+              <a:t>Mutex</a:t>
+            </a:r>
+            <a:r>
+              <a:rPr lang="en-US" dirty="0"/>
+              <a:t>. If the calling thread is not the thread that obtained the </a:t>
+            </a:r>
+            <a:r>
+              <a:rPr lang="en-US" b="1" dirty="0" err="1"/>
+              <a:t>Mutex</a:t>
+            </a:r>
+            <a:r>
+              <a:rPr lang="en-US" dirty="0"/>
+              <a:t>, then the </a:t>
+            </a:r>
+            <a:r>
+              <a:rPr lang="en-US" b="1" dirty="0" err="1"/>
+              <a:t>Mutex</a:t>
+            </a:r>
+            <a:r>
+              <a:rPr lang="en-US" dirty="0"/>
+              <a:t> object’s state is unaltered and </a:t>
+            </a:r>
+            <a:r>
+              <a:rPr lang="en-US" b="1" dirty="0" err="1"/>
+              <a:t>ReleaseMutex</a:t>
+            </a:r>
+            <a:r>
+              <a:rPr lang="en-US" dirty="0"/>
+              <a:t> throws a </a:t>
+            </a:r>
+            <a:r>
+              <a:rPr lang="en-US" b="1" dirty="0" err="1"/>
+              <a:t>System.ApplicationException</a:t>
+            </a:r>
+            <a:r>
+              <a:rPr lang="en-US" dirty="0"/>
+              <a:t>. </a:t>
+            </a:r>
+            <a:endParaRPr lang="en-US" dirty="0" smtClean="0"/>
+          </a:p>
+          <a:p>
+            <a:r>
+              <a:rPr lang="en-US" dirty="0" smtClean="0"/>
+              <a:t>If </a:t>
+            </a:r>
+            <a:r>
+              <a:rPr lang="en-US" dirty="0"/>
+              <a:t>a thread owning a </a:t>
+            </a:r>
+            <a:r>
+              <a:rPr lang="en-US" b="1" dirty="0" err="1"/>
+              <a:t>Mutex</a:t>
+            </a:r>
+            <a:r>
+              <a:rPr lang="en-US" dirty="0"/>
+              <a:t> terminates for any reason, then some thread waiting on the </a:t>
+            </a:r>
+            <a:r>
+              <a:rPr lang="en-US" b="1" dirty="0" err="1"/>
+              <a:t>Mutex</a:t>
+            </a:r>
+            <a:r>
+              <a:rPr lang="en-US" dirty="0"/>
+              <a:t> will be awakened by having a </a:t>
+            </a:r>
+            <a:r>
+              <a:rPr lang="en-US" b="1" dirty="0" err="1" smtClean="0"/>
+              <a:t>AbandonedMutexException</a:t>
+            </a:r>
+            <a:r>
+              <a:rPr lang="en-US" dirty="0" smtClean="0"/>
+              <a:t> thrown.</a:t>
+            </a:r>
+          </a:p>
+          <a:p>
+            <a:r>
+              <a:rPr lang="en-US" b="1" dirty="0" err="1" smtClean="0"/>
+              <a:t>Mutex</a:t>
+            </a:r>
+            <a:r>
+              <a:rPr lang="en-US" dirty="0" smtClean="0"/>
+              <a:t> </a:t>
+            </a:r>
+            <a:r>
+              <a:rPr lang="en-US" dirty="0"/>
+              <a:t>objects maintain a recursion count indicating how many times the owning thread owns the </a:t>
+            </a:r>
+            <a:r>
+              <a:rPr lang="en-US" b="1" dirty="0" err="1"/>
+              <a:t>Mutex</a:t>
+            </a:r>
+            <a:r>
+              <a:rPr lang="en-US" dirty="0" smtClean="0"/>
+              <a:t>.</a:t>
+            </a:r>
+          </a:p>
+          <a:p>
+            <a:r>
+              <a:rPr lang="en-US" dirty="0"/>
+              <a:t>If a thread currently owns a </a:t>
+            </a:r>
+            <a:r>
+              <a:rPr lang="en-US" dirty="0" err="1"/>
+              <a:t>Mutex</a:t>
+            </a:r>
+            <a:r>
+              <a:rPr lang="en-US" dirty="0"/>
+              <a:t> and then that thread waits on the </a:t>
+            </a:r>
+            <a:r>
+              <a:rPr lang="en-US" dirty="0" err="1"/>
+              <a:t>Mutex</a:t>
+            </a:r>
+            <a:r>
+              <a:rPr lang="en-US" dirty="0"/>
+              <a:t> again, the recursion count is incremented and the thread is allowed to continue running. When that thread calls </a:t>
+            </a:r>
+            <a:r>
+              <a:rPr lang="en-US" dirty="0" err="1"/>
+              <a:t>ReleaseMutex</a:t>
+            </a:r>
+            <a:r>
+              <a:rPr lang="en-US" dirty="0"/>
+              <a:t>, the recursion count is decremented. Only when the recursion count becomes 0 can another thread become the owner of the </a:t>
+            </a:r>
+            <a:r>
+              <a:rPr lang="en-US" dirty="0" err="1"/>
+              <a:t>Mutex</a:t>
+            </a:r>
+            <a:r>
+              <a:rPr lang="en-US" dirty="0"/>
+              <a:t>.</a:t>
+            </a:r>
+          </a:p>
+        </p:txBody>
+      </p:sp>
+    </p:spTree>
+    <p:extLst>
+      <p:ext uri="{BB962C8B-B14F-4D97-AF65-F5344CB8AC3E}">
+        <p14:creationId xmlns:p14="http://schemas.microsoft.com/office/powerpoint/2010/main" val="1038548964"/>
+      </p:ext>
+    </p:extLst>
+  </p:cSld>
+  <p:clrMapOvr>
+    <a:masterClrMapping/>
+  </p:clrMapOvr>
+</p:sld>
+</file>
+
 <file path=ppt/slides/slide2.xml><?xml version="1.0" encoding="utf-8"?>
 <p:sld xmlns:a="http://schemas.openxmlformats.org/drawingml/2006/main" xmlns:r="http://schemas.openxmlformats.org/officeDocument/2006/relationships" xmlns:p="http://schemas.openxmlformats.org/presentationml/2006/main">
   <p:cSld>
@@ -6313,11 +7997,7 @@
           <a:p>
             <a:r>
               <a:rPr lang="en-US" dirty="0" smtClean="0"/>
-              <a:t>Thread </a:t>
-            </a:r>
-            <a:r>
-              <a:rPr lang="en-US" dirty="0" smtClean="0"/>
-              <a:t>synchronization</a:t>
+              <a:t>Thread synchronization</a:t>
             </a:r>
             <a:endParaRPr lang="en-US" dirty="0"/>
           </a:p>

</xml_diff>